<commit_message>
entrega final feature engineering
</commit_message>
<xml_diff>
--- a/Feature_Engeneering/MBA FIAP - Apresentacao - editada2.pptx
+++ b/Feature_Engeneering/MBA FIAP - Apresentacao - editada2.pptx
@@ -133,6 +133,35 @@
 </p:presentation>
 </file>
 
+<file path=ppt/changesInfos/changesInfo1.xml><?xml version="1.0" encoding="utf-8"?>
+<pc:chgInfo xmlns:a="http://schemas.openxmlformats.org/drawingml/2006/main" xmlns:r="http://schemas.openxmlformats.org/officeDocument/2006/relationships" xmlns:ac="http://schemas.microsoft.com/office/drawing/2013/main/command" xmlns:pc="http://schemas.microsoft.com/office/powerpoint/2013/main/command">
+  <pc:docChgLst>
+    <pc:chgData name="Guilherme Ferreira Luz" userId="7d69f7dc-4d7f-4c54-a1cb-d9f3385a4e32" providerId="ADAL" clId="{2F70C20F-EF01-4FB1-9E92-66CB23624E5D}"/>
+    <pc:docChg chg="modSld">
+      <pc:chgData name="Guilherme Ferreira Luz" userId="7d69f7dc-4d7f-4c54-a1cb-d9f3385a4e32" providerId="ADAL" clId="{2F70C20F-EF01-4FB1-9E92-66CB23624E5D}" dt="2024-10-01T01:48:06.857" v="0" actId="20577"/>
+      <pc:docMkLst>
+        <pc:docMk/>
+      </pc:docMkLst>
+      <pc:sldChg chg="modSp mod">
+        <pc:chgData name="Guilherme Ferreira Luz" userId="7d69f7dc-4d7f-4c54-a1cb-d9f3385a4e32" providerId="ADAL" clId="{2F70C20F-EF01-4FB1-9E92-66CB23624E5D}" dt="2024-10-01T01:48:06.857" v="0" actId="20577"/>
+        <pc:sldMkLst>
+          <pc:docMk/>
+          <pc:sldMk cId="891601483" sldId="256"/>
+        </pc:sldMkLst>
+        <pc:spChg chg="mod">
+          <ac:chgData name="Guilherme Ferreira Luz" userId="7d69f7dc-4d7f-4c54-a1cb-d9f3385a4e32" providerId="ADAL" clId="{2F70C20F-EF01-4FB1-9E92-66CB23624E5D}" dt="2024-10-01T01:48:06.857" v="0" actId="20577"/>
+          <ac:spMkLst>
+            <pc:docMk/>
+            <pc:sldMk cId="891601483" sldId="256"/>
+            <ac:spMk id="11" creationId="{AB10DB3F-1AEF-50D2-1833-0E9DE207ECA5}"/>
+          </ac:spMkLst>
+        </pc:spChg>
+      </pc:sldChg>
+    </pc:docChg>
+  </pc:docChgLst>
+</pc:chgInfo>
+</file>
+
 <file path=ppt/slideLayouts/slideLayout1.xml><?xml version="1.0" encoding="utf-8"?>
 <p:sldLayout xmlns:a="http://schemas.openxmlformats.org/drawingml/2006/main" xmlns:r="http://schemas.openxmlformats.org/officeDocument/2006/relationships" xmlns:p="http://schemas.openxmlformats.org/presentationml/2006/main" type="title" preserve="1">
   <p:cSld name="Slide de Título">
@@ -334,7 +363,7 @@
           <a:p>
             <a:fld id="{2CAFDEA7-47EB-4A32-ADF3-4D2B92AF8BE0}" type="slidenum">
               <a:rPr lang="pt-BR" smtClean="0"/>
-              <a:t>‹#›</a:t>
+              <a:t>‹nº›</a:t>
             </a:fld>
             <a:endParaRPr lang="pt-BR"/>
           </a:p>
@@ -532,7 +561,7 @@
           <a:p>
             <a:fld id="{2CAFDEA7-47EB-4A32-ADF3-4D2B92AF8BE0}" type="slidenum">
               <a:rPr lang="pt-BR" smtClean="0"/>
-              <a:t>‹#›</a:t>
+              <a:t>‹nº›</a:t>
             </a:fld>
             <a:endParaRPr lang="pt-BR"/>
           </a:p>
@@ -740,7 +769,7 @@
           <a:p>
             <a:fld id="{2CAFDEA7-47EB-4A32-ADF3-4D2B92AF8BE0}" type="slidenum">
               <a:rPr lang="pt-BR" smtClean="0"/>
-              <a:t>‹#›</a:t>
+              <a:t>‹nº›</a:t>
             </a:fld>
             <a:endParaRPr lang="pt-BR"/>
           </a:p>
@@ -938,7 +967,7 @@
           <a:p>
             <a:fld id="{2CAFDEA7-47EB-4A32-ADF3-4D2B92AF8BE0}" type="slidenum">
               <a:rPr lang="pt-BR" smtClean="0"/>
-              <a:t>‹#›</a:t>
+              <a:t>‹nº›</a:t>
             </a:fld>
             <a:endParaRPr lang="pt-BR"/>
           </a:p>
@@ -1213,7 +1242,7 @@
           <a:p>
             <a:fld id="{2CAFDEA7-47EB-4A32-ADF3-4D2B92AF8BE0}" type="slidenum">
               <a:rPr lang="pt-BR" smtClean="0"/>
-              <a:t>‹#›</a:t>
+              <a:t>‹nº›</a:t>
             </a:fld>
             <a:endParaRPr lang="pt-BR"/>
           </a:p>
@@ -1478,7 +1507,7 @@
           <a:p>
             <a:fld id="{2CAFDEA7-47EB-4A32-ADF3-4D2B92AF8BE0}" type="slidenum">
               <a:rPr lang="pt-BR" smtClean="0"/>
-              <a:t>‹#›</a:t>
+              <a:t>‹nº›</a:t>
             </a:fld>
             <a:endParaRPr lang="pt-BR"/>
           </a:p>
@@ -1890,7 +1919,7 @@
           <a:p>
             <a:fld id="{2CAFDEA7-47EB-4A32-ADF3-4D2B92AF8BE0}" type="slidenum">
               <a:rPr lang="pt-BR" smtClean="0"/>
-              <a:t>‹#›</a:t>
+              <a:t>‹nº›</a:t>
             </a:fld>
             <a:endParaRPr lang="pt-BR"/>
           </a:p>
@@ -2031,7 +2060,7 @@
           <a:p>
             <a:fld id="{2CAFDEA7-47EB-4A32-ADF3-4D2B92AF8BE0}" type="slidenum">
               <a:rPr lang="pt-BR" smtClean="0"/>
-              <a:t>‹#›</a:t>
+              <a:t>‹nº›</a:t>
             </a:fld>
             <a:endParaRPr lang="pt-BR"/>
           </a:p>
@@ -2144,7 +2173,7 @@
           <a:p>
             <a:fld id="{2CAFDEA7-47EB-4A32-ADF3-4D2B92AF8BE0}" type="slidenum">
               <a:rPr lang="pt-BR" smtClean="0"/>
-              <a:t>‹#›</a:t>
+              <a:t>‹nº›</a:t>
             </a:fld>
             <a:endParaRPr lang="pt-BR"/>
           </a:p>
@@ -2455,7 +2484,7 @@
           <a:p>
             <a:fld id="{2CAFDEA7-47EB-4A32-ADF3-4D2B92AF8BE0}" type="slidenum">
               <a:rPr lang="pt-BR" smtClean="0"/>
-              <a:t>‹#›</a:t>
+              <a:t>‹nº›</a:t>
             </a:fld>
             <a:endParaRPr lang="pt-BR"/>
           </a:p>
@@ -2743,7 +2772,7 @@
           <a:p>
             <a:fld id="{2CAFDEA7-47EB-4A32-ADF3-4D2B92AF8BE0}" type="slidenum">
               <a:rPr lang="pt-BR" smtClean="0"/>
-              <a:t>‹#›</a:t>
+              <a:t>‹nº›</a:t>
             </a:fld>
             <a:endParaRPr lang="pt-BR"/>
           </a:p>
@@ -3020,7 +3049,7 @@
           <a:p>
             <a:fld id="{2CAFDEA7-47EB-4A32-ADF3-4D2B92AF8BE0}" type="slidenum">
               <a:rPr lang="pt-BR" smtClean="0"/>
-              <a:t>‹#›</a:t>
+              <a:t>‹nº›</a:t>
             </a:fld>
             <a:endParaRPr lang="pt-BR"/>
           </a:p>
@@ -3482,7 +3511,7 @@
                 <a:ea typeface="Tahoma" panose="020B0604030504040204" pitchFamily="34" charset="0"/>
                 <a:cs typeface="Tahoma" panose="020B0604030504040204" pitchFamily="34" charset="0"/>
               </a:rPr>
-              <a:t>TIAGO HOVADICK – RM 354679 </a:t>
+              <a:t>TIAGO HOVADICK – RM354679 </a:t>
             </a:r>
           </a:p>
         </p:txBody>

</xml_diff>